<commit_message>
retoques no bd, documentação e slides
</commit_message>
<xml_diff>
--- a/documentos/General Fight.pptx
+++ b/documentos/General Fight.pptx
@@ -13,21 +13,22 @@
     <p:sldId id="261" r:id="rId11"/>
     <p:sldId id="262" r:id="rId12"/>
     <p:sldId id="263" r:id="rId13"/>
+    <p:sldId id="264" r:id="rId14"/>
   </p:sldIdLst>
   <p:sldSz cx="18288000" cy="10287000"/>
   <p:notesSz cx="6858000" cy="9144000"/>
   <p:embeddedFontLst>
     <p:embeddedFont>
       <p:font typeface="Poppins Bold" charset="1" panose="00000800000000000000"/>
-      <p:regular r:id="rId14"/>
+      <p:regular r:id="rId15"/>
     </p:embeddedFont>
     <p:embeddedFont>
       <p:font typeface="Open Sans" charset="1" panose="020B0606030504020204"/>
-      <p:regular r:id="rId15"/>
+      <p:regular r:id="rId16"/>
     </p:embeddedFont>
     <p:embeddedFont>
       <p:font typeface="Open Sans Bold" charset="1" panose="020B0806030504020204"/>
-      <p:regular r:id="rId16"/>
+      <p:regular r:id="rId17"/>
     </p:embeddedFont>
   </p:embeddedFontLst>
   <p:defaultTextStyle>
@@ -4057,6 +4058,91 @@
         </p:nvSpPr>
         <p:spPr>
           <a:xfrm rot="0">
+            <a:off x="5259884" y="3460115"/>
+            <a:ext cx="7768233" cy="3195319"/>
+          </a:xfrm>
+          <a:prstGeom prst="rect">
+            <a:avLst/>
+          </a:prstGeom>
+        </p:spPr>
+        <p:txBody>
+          <a:bodyPr anchor="t" rtlCol="false" tIns="0" lIns="0" bIns="0" rIns="0">
+            <a:spAutoFit/>
+          </a:bodyPr>
+          <a:lstStyle/>
+          <a:p>
+            <a:pPr algn="ctr">
+              <a:lnSpc>
+                <a:spcPts val="12880"/>
+              </a:lnSpc>
+            </a:pPr>
+            <a:r>
+              <a:rPr lang="en-US" sz="9200" b="true">
+                <a:solidFill>
+                  <a:srgbClr val="000000"/>
+                </a:solidFill>
+                <a:latin typeface="Open Sans Bold"/>
+                <a:ea typeface="Open Sans Bold"/>
+                <a:cs typeface="Open Sans Bold"/>
+                <a:sym typeface="Open Sans Bold"/>
+              </a:rPr>
+              <a:t>Dificuldades?</a:t>
+            </a:r>
+          </a:p>
+          <a:p>
+            <a:pPr algn="ctr">
+              <a:lnSpc>
+                <a:spcPts val="12880"/>
+              </a:lnSpc>
+            </a:pPr>
+            <a:r>
+              <a:rPr lang="en-US" b="true" sz="9200">
+                <a:solidFill>
+                  <a:srgbClr val="000000"/>
+                </a:solidFill>
+                <a:latin typeface="Open Sans Bold"/>
+                <a:ea typeface="Open Sans Bold"/>
+                <a:cs typeface="Open Sans Bold"/>
+                <a:sym typeface="Open Sans Bold"/>
+              </a:rPr>
+              <a:t>Superações?</a:t>
+            </a:r>
+          </a:p>
+        </p:txBody>
+      </p:sp>
+    </p:spTree>
+  </p:cSld>
+  <p:clrMapOvr>
+    <a:masterClrMapping/>
+  </p:clrMapOvr>
+</p:sld>
+</file>
+
+<file path=ppt/slides/slide8.xml><?xml version="1.0" encoding="utf-8"?>
+<p:sld xmlns:p="http://schemas.openxmlformats.org/presentationml/2006/main" xmlns:a="http://schemas.openxmlformats.org/drawingml/2006/main">
+  <p:cSld>
+    <p:spTree>
+      <p:nvGrpSpPr>
+        <p:cNvPr id="1" name=""/>
+        <p:cNvGrpSpPr/>
+        <p:nvPr/>
+      </p:nvGrpSpPr>
+      <p:grpSpPr>
+        <a:xfrm>
+          <a:off x="0" y="0"/>
+          <a:ext cx="0" cy="0"/>
+          <a:chOff x="0" y="0"/>
+          <a:chExt cx="0" cy="0"/>
+        </a:xfrm>
+      </p:grpSpPr>
+      <p:sp>
+        <p:nvSpPr>
+          <p:cNvPr name="TextBox 2" id="2"/>
+          <p:cNvSpPr txBox="true"/>
+          <p:nvPr/>
+        </p:nvSpPr>
+        <p:spPr>
+          <a:xfrm rot="0">
             <a:off x="4391025" y="857250"/>
             <a:ext cx="9505950" cy="1566544"/>
           </a:xfrm>
@@ -4099,7 +4185,7 @@
         <p:spPr>
           <a:xfrm rot="0">
             <a:off x="1028700" y="3346450"/>
-            <a:ext cx="12522101" cy="3508374"/>
+            <a:ext cx="12522101" cy="4213224"/>
           </a:xfrm>
           <a:prstGeom prst="rect">
             <a:avLst/>
@@ -4215,6 +4301,27 @@
               <a:t>Brandão - pelo desafio proposto</a:t>
             </a:r>
           </a:p>
+          <a:p>
+            <a:pPr algn="ctr" marL="863606" indent="-431803" lvl="1">
+              <a:lnSpc>
+                <a:spcPts val="5600"/>
+              </a:lnSpc>
+              <a:buFont typeface="Arial"/>
+              <a:buChar char="•"/>
+            </a:pPr>
+            <a:r>
+              <a:rPr lang="en-US" sz="4000">
+                <a:solidFill>
+                  <a:srgbClr val="000000"/>
+                </a:solidFill>
+                <a:latin typeface="Open Sans"/>
+                <a:ea typeface="Open Sans"/>
+                <a:cs typeface="Open Sans"/>
+                <a:sym typeface="Open Sans"/>
+              </a:rPr>
+              <a:t>Júlia - pelos primeiros passos na sala técnica</a:t>
+            </a:r>
+          </a:p>
         </p:txBody>
       </p:sp>
     </p:spTree>
@@ -4225,7 +4332,7 @@
 </p:sld>
 </file>
 
-<file path=ppt/slides/slide8.xml><?xml version="1.0" encoding="utf-8"?>
+<file path=ppt/slides/slide9.xml><?xml version="1.0" encoding="utf-8"?>
 <p:sld xmlns:p="http://schemas.openxmlformats.org/presentationml/2006/main" xmlns:a="http://schemas.openxmlformats.org/drawingml/2006/main">
   <p:cSld>
     <p:spTree>

</xml_diff>